<commit_message>
updated with more formatting fixes
</commit_message>
<xml_diff>
--- a/Code_Review_and_Standups.pptx
+++ b/Code_Review_and_Standups.pptx
@@ -4983,6 +4983,13 @@
   <p:clrMapOvr>
     <a:masterClrMapping/>
   </p:clrMapOvr>
+  <p:timing>
+    <p:tnLst>
+      <p:par>
+        <p:cTn id="1" dur="indefinite" restart="never" nodeType="tmRoot"/>
+      </p:par>
+    </p:tnLst>
+  </p:timing>
 </p:sld>
 </file>
 
@@ -5442,6 +5449,13 @@
   <p:clrMapOvr>
     <a:masterClrMapping/>
   </p:clrMapOvr>
+  <p:timing>
+    <p:tnLst>
+      <p:par>
+        <p:cTn id="1" dur="indefinite" restart="never" nodeType="tmRoot"/>
+      </p:par>
+    </p:tnLst>
+  </p:timing>
 </p:sld>
 </file>
 

</xml_diff>